<commit_message>
feat: update slideshow #3
</commit_message>
<xml_diff>
--- a/presentation/slideshow.pptx
+++ b/presentation/slideshow.pptx
@@ -357,7 +357,7 @@
           <a:p>
             <a:fld id="{96DFF08F-DC6B-4601-B491-B0F83F6DD2DA}" type="datetimeFigureOut">
               <a:rPr lang="en-US" smtClean="0"/>
-              <a:t>1/30/2023</a:t>
+              <a:t>1/31/2023</a:t>
             </a:fld>
             <a:endParaRPr lang="en-US" dirty="0"/>
           </a:p>
@@ -565,7 +565,7 @@
           <a:p>
             <a:fld id="{96DFF08F-DC6B-4601-B491-B0F83F6DD2DA}" type="datetimeFigureOut">
               <a:rPr lang="en-US" smtClean="0"/>
-              <a:t>1/30/2023</a:t>
+              <a:t>1/31/2023</a:t>
             </a:fld>
             <a:endParaRPr lang="en-US" dirty="0"/>
           </a:p>
@@ -821,7 +821,7 @@
           <a:p>
             <a:fld id="{96DFF08F-DC6B-4601-B491-B0F83F6DD2DA}" type="datetimeFigureOut">
               <a:rPr lang="en-US" smtClean="0"/>
-              <a:t>1/30/2023</a:t>
+              <a:t>1/31/2023</a:t>
             </a:fld>
             <a:endParaRPr lang="en-US" dirty="0"/>
           </a:p>
@@ -991,7 +991,7 @@
           <a:p>
             <a:fld id="{D62CEF3B-A037-46D0-B02C-1428F07E9383}" type="datetimeFigureOut">
               <a:rPr lang="en-US" smtClean="0"/>
-              <a:t>1/30/2023</a:t>
+              <a:t>1/31/2023</a:t>
             </a:fld>
             <a:endParaRPr lang="en-US" dirty="0"/>
           </a:p>
@@ -1334,7 +1334,7 @@
           <a:p>
             <a:fld id="{96DFF08F-DC6B-4601-B491-B0F83F6DD2DA}" type="datetimeFigureOut">
               <a:rPr lang="en-US" smtClean="0"/>
-              <a:t>1/30/2023</a:t>
+              <a:t>1/31/2023</a:t>
             </a:fld>
             <a:endParaRPr lang="en-US" dirty="0"/>
           </a:p>
@@ -1609,7 +1609,7 @@
           <a:p>
             <a:fld id="{96DFF08F-DC6B-4601-B491-B0F83F6DD2DA}" type="datetimeFigureOut">
               <a:rPr lang="en-US" smtClean="0"/>
-              <a:t>1/30/2023</a:t>
+              <a:t>1/31/2023</a:t>
             </a:fld>
             <a:endParaRPr lang="en-US" dirty="0"/>
           </a:p>
@@ -1988,7 +1988,7 @@
           <a:p>
             <a:fld id="{96DFF08F-DC6B-4601-B491-B0F83F6DD2DA}" type="datetimeFigureOut">
               <a:rPr lang="en-US" smtClean="0"/>
-              <a:t>1/30/2023</a:t>
+              <a:t>1/31/2023</a:t>
             </a:fld>
             <a:endParaRPr lang="en-US" dirty="0"/>
           </a:p>
@@ -2106,7 +2106,7 @@
           <a:p>
             <a:fld id="{96DFF08F-DC6B-4601-B491-B0F83F6DD2DA}" type="datetimeFigureOut">
               <a:rPr lang="en-US" smtClean="0"/>
-              <a:t>1/30/2023</a:t>
+              <a:t>1/31/2023</a:t>
             </a:fld>
             <a:endParaRPr lang="en-US" dirty="0"/>
           </a:p>
@@ -2278,7 +2278,7 @@
             <a:fld id="{96DFF08F-DC6B-4601-B491-B0F83F6DD2DA}" type="datetimeFigureOut">
               <a:rPr lang="en-US" smtClean="0"/>
               <a:pPr/>
-              <a:t>1/30/2023</a:t>
+              <a:t>1/31/2023</a:t>
             </a:fld>
             <a:endParaRPr lang="en-US" dirty="0"/>
           </a:p>
@@ -2634,7 +2634,7 @@
             <a:fld id="{96DFF08F-DC6B-4601-B491-B0F83F6DD2DA}" type="datetimeFigureOut">
               <a:rPr lang="en-US" smtClean="0"/>
               <a:pPr/>
-              <a:t>1/30/2023</a:t>
+              <a:t>1/31/2023</a:t>
             </a:fld>
             <a:endParaRPr lang="en-US" dirty="0"/>
           </a:p>
@@ -3012,7 +3012,7 @@
           <a:p>
             <a:fld id="{96DFF08F-DC6B-4601-B491-B0F83F6DD2DA}" type="datetimeFigureOut">
               <a:rPr lang="en-US" smtClean="0"/>
-              <a:t>1/30/2023</a:t>
+              <a:t>1/31/2023</a:t>
             </a:fld>
             <a:endParaRPr lang="en-US" dirty="0"/>
           </a:p>
@@ -3300,7 +3300,7 @@
             <a:fld id="{96DFF08F-DC6B-4601-B491-B0F83F6DD2DA}" type="datetimeFigureOut">
               <a:rPr lang="en-US" smtClean="0"/>
               <a:pPr/>
-              <a:t>1/30/2023</a:t>
+              <a:t>1/31/2023</a:t>
             </a:fld>
             <a:endParaRPr lang="en-US" dirty="0"/>
           </a:p>
@@ -3892,15 +3892,7 @@
           <a:p>
             <a:r>
               <a:rPr lang="fr-FR" cap="none" dirty="0"/>
-              <a:t>Marc Pinet – </a:t>
-            </a:r>
-            <a:r>
-              <a:rPr lang="fr-FR" cap="none"/>
-              <a:t>Arthur Rodriguez – </a:t>
-            </a:r>
-            <a:r>
-              <a:rPr lang="fr-FR" cap="none" dirty="0"/>
-              <a:t>Marcus Aas Jensen – Loïc </a:t>
+              <a:t>Marc Pinet – Arthur Rodriguez – Marcus Aas Jensen – Loïc </a:t>
             </a:r>
             <a:r>
               <a:rPr lang="fr-FR" cap="none" dirty="0" err="1"/>
@@ -4065,31 +4057,6 @@
           </a:p>
         </p:txBody>
       </p:sp>
-      <p:sp>
-        <p:nvSpPr>
-          <p:cNvPr id="9" name="Text Placeholder 8">
-            <a:extLst>
-              <a:ext uri="{FF2B5EF4-FFF2-40B4-BE49-F238E27FC236}">
-                <a16:creationId xmlns:a16="http://schemas.microsoft.com/office/drawing/2014/main" id="{130D5712-4981-A2CE-6214-172DDA8A313B}"/>
-              </a:ext>
-            </a:extLst>
-          </p:cNvPr>
-          <p:cNvSpPr>
-            <a:spLocks noGrp="1"/>
-          </p:cNvSpPr>
-          <p:nvPr>
-            <p:ph type="body" sz="half" idx="2"/>
-          </p:nvPr>
-        </p:nvSpPr>
-        <p:spPr/>
-        <p:txBody>
-          <a:bodyPr/>
-          <a:lstStyle/>
-          <a:p>
-            <a:endParaRPr lang="en-US" dirty="0"/>
-          </a:p>
-        </p:txBody>
-      </p:sp>
       <p:pic>
         <p:nvPicPr>
           <p:cNvPr id="5122" name="Picture 2">
@@ -4211,31 +4178,6 @@
           </a:p>
         </p:txBody>
       </p:sp>
-      <p:sp>
-        <p:nvSpPr>
-          <p:cNvPr id="9" name="Text Placeholder 8">
-            <a:extLst>
-              <a:ext uri="{FF2B5EF4-FFF2-40B4-BE49-F238E27FC236}">
-                <a16:creationId xmlns:a16="http://schemas.microsoft.com/office/drawing/2014/main" id="{130D5712-4981-A2CE-6214-172DDA8A313B}"/>
-              </a:ext>
-            </a:extLst>
-          </p:cNvPr>
-          <p:cNvSpPr>
-            <a:spLocks noGrp="1"/>
-          </p:cNvSpPr>
-          <p:nvPr>
-            <p:ph type="body" sz="half" idx="2"/>
-          </p:nvPr>
-        </p:nvSpPr>
-        <p:spPr/>
-        <p:txBody>
-          <a:bodyPr/>
-          <a:lstStyle/>
-          <a:p>
-            <a:endParaRPr lang="en-US" dirty="0"/>
-          </a:p>
-        </p:txBody>
-      </p:sp>
       <p:pic>
         <p:nvPicPr>
           <p:cNvPr id="6146" name="Picture 2">
@@ -4360,31 +4302,6 @@
           </a:p>
         </p:txBody>
       </p:sp>
-      <p:sp>
-        <p:nvSpPr>
-          <p:cNvPr id="9" name="Text Placeholder 8">
-            <a:extLst>
-              <a:ext uri="{FF2B5EF4-FFF2-40B4-BE49-F238E27FC236}">
-                <a16:creationId xmlns:a16="http://schemas.microsoft.com/office/drawing/2014/main" id="{130D5712-4981-A2CE-6214-172DDA8A313B}"/>
-              </a:ext>
-            </a:extLst>
-          </p:cNvPr>
-          <p:cNvSpPr>
-            <a:spLocks noGrp="1"/>
-          </p:cNvSpPr>
-          <p:nvPr>
-            <p:ph type="body" sz="half" idx="2"/>
-          </p:nvPr>
-        </p:nvSpPr>
-        <p:spPr/>
-        <p:txBody>
-          <a:bodyPr/>
-          <a:lstStyle/>
-          <a:p>
-            <a:endParaRPr lang="en-US" dirty="0"/>
-          </a:p>
-        </p:txBody>
-      </p:sp>
       <p:pic>
         <p:nvPicPr>
           <p:cNvPr id="7170" name="Picture 2">
@@ -4502,31 +4419,6 @@
           </a:p>
         </p:txBody>
       </p:sp>
-      <p:sp>
-        <p:nvSpPr>
-          <p:cNvPr id="9" name="Text Placeholder 8">
-            <a:extLst>
-              <a:ext uri="{FF2B5EF4-FFF2-40B4-BE49-F238E27FC236}">
-                <a16:creationId xmlns:a16="http://schemas.microsoft.com/office/drawing/2014/main" id="{130D5712-4981-A2CE-6214-172DDA8A313B}"/>
-              </a:ext>
-            </a:extLst>
-          </p:cNvPr>
-          <p:cNvSpPr>
-            <a:spLocks noGrp="1"/>
-          </p:cNvSpPr>
-          <p:nvPr>
-            <p:ph type="body" sz="half" idx="2"/>
-          </p:nvPr>
-        </p:nvSpPr>
-        <p:spPr/>
-        <p:txBody>
-          <a:bodyPr/>
-          <a:lstStyle/>
-          <a:p>
-            <a:endParaRPr lang="en-US" dirty="0"/>
-          </a:p>
-        </p:txBody>
-      </p:sp>
       <p:pic>
         <p:nvPicPr>
           <p:cNvPr id="8194" name="Picture 2">
@@ -5839,7 +5731,7 @@
             </a:r>
             <a:r>
               <a:rPr lang="fr-FR" sz="2800" dirty="0" err="1"/>
-              <a:t>logisim</a:t>
+              <a:t>Logisim</a:t>
             </a:r>
             <a:endParaRPr lang="fr-FR" sz="2800" dirty="0"/>
           </a:p>
@@ -7584,10 +7476,10 @@
       </p:sp>
       <p:pic>
         <p:nvPicPr>
-          <p:cNvPr id="2050" name="Picture 2">
+          <p:cNvPr id="1026" name="Picture 2">
             <a:extLst>
               <a:ext uri="{FF2B5EF4-FFF2-40B4-BE49-F238E27FC236}">
-                <a16:creationId xmlns:a16="http://schemas.microsoft.com/office/drawing/2014/main" id="{F362CB6D-40AB-7077-69BE-042B1B533F31}"/>
+                <a16:creationId xmlns:a16="http://schemas.microsoft.com/office/drawing/2014/main" id="{6022E40C-1EDC-79E0-E1F2-99B3DCAD0316}"/>
               </a:ext>
             </a:extLst>
           </p:cNvPr>
@@ -7611,8 +7503,8 @@
         </p:blipFill>
         <p:spPr bwMode="auto">
           <a:xfrm>
-            <a:off x="4764526" y="1384184"/>
-            <a:ext cx="6627665" cy="4089632"/>
+            <a:off x="4284005" y="1003297"/>
+            <a:ext cx="7618473" cy="4699001"/>
           </a:xfrm>
           <a:prstGeom prst="rect">
             <a:avLst/>
@@ -8149,31 +8041,6 @@
               <a:t>processing</a:t>
             </a:r>
             <a:endParaRPr lang="en-US" sz="4800" dirty="0"/>
-          </a:p>
-        </p:txBody>
-      </p:sp>
-      <p:sp>
-        <p:nvSpPr>
-          <p:cNvPr id="9" name="Text Placeholder 8">
-            <a:extLst>
-              <a:ext uri="{FF2B5EF4-FFF2-40B4-BE49-F238E27FC236}">
-                <a16:creationId xmlns:a16="http://schemas.microsoft.com/office/drawing/2014/main" id="{130D5712-4981-A2CE-6214-172DDA8A313B}"/>
-              </a:ext>
-            </a:extLst>
-          </p:cNvPr>
-          <p:cNvSpPr>
-            <a:spLocks noGrp="1"/>
-          </p:cNvSpPr>
-          <p:nvPr>
-            <p:ph type="body" sz="half" idx="2"/>
-          </p:nvPr>
-        </p:nvSpPr>
-        <p:spPr/>
-        <p:txBody>
-          <a:bodyPr/>
-          <a:lstStyle/>
-          <a:p>
-            <a:endParaRPr lang="en-US" dirty="0"/>
           </a:p>
         </p:txBody>
       </p:sp>

</xml_diff>